<commit_message>
Added license usage to export
</commit_message>
<xml_diff>
--- a/assets/report_analysis_template.pptx
+++ b/assets/report_analysis_template.pptx
@@ -127,6 +127,14 @@
 </p:presentation>
 </file>
 
+<file path=ppt/revisionInfo.xml><?xml version="1.0" encoding="utf-8"?>
+<p1510:revInfo xmlns:a="http://schemas.openxmlformats.org/drawingml/2006/main" xmlns:r="http://schemas.openxmlformats.org/officeDocument/2006/relationships" xmlns:p1510="http://schemas.microsoft.com/office/powerpoint/2015/10/main">
+  <p1510:revLst>
+    <p1510:client id="{C3449066-AEF8-2A59-13ED-A8B6F41A4B44}" v="13" dt="2023-02-12T09:10:33.907"/>
+  </p1510:revLst>
+</p1510:revInfo>
+</file>
+
 <file path=ppt/notesMasters/notesMaster1.xml><?xml version="1.0" encoding="utf-8"?>
 <p:notesMaster xmlns:a="http://schemas.openxmlformats.org/drawingml/2006/main" xmlns:r="http://schemas.openxmlformats.org/officeDocument/2006/relationships" xmlns:p="http://schemas.openxmlformats.org/presentationml/2006/main">
   <p:cSld>
@@ -215,7 +223,7 @@
             </a:pPr>
             <a:fld id="{9EF84483-4907-4066-933F-C4A20CBB72BF}" type="datetimeFigureOut">
               <a:rPr lang="de-DE"/>
-              <a:t>01.02.2023</a:t>
+              <a:t>12.02.2023</a:t>
             </a:fld>
             <a:endParaRPr lang="de-DE"/>
           </a:p>
@@ -397,7 +405,7 @@
             </a:pPr>
             <a:fld id="{CCA2E1E0-A6B2-47BC-BCEB-AE3674EF8D48}" type="slidenum">
               <a:rPr lang="de-DE"/>
-              <a:t>‹#›</a:t>
+              <a:t>‹Nr.›</a:t>
             </a:fld>
             <a:endParaRPr lang="de-DE"/>
           </a:p>
@@ -829,7 +837,7 @@
             </a:pPr>
             <a:fld id="{634C9186-2F28-4E19-826F-AE5B93E5979C}" type="slidenum">
               <a:rPr lang="de-DE"/>
-              <a:t>‹#›</a:t>
+              <a:t>‹Nr.›</a:t>
             </a:fld>
             <a:endParaRPr lang="de-DE"/>
           </a:p>
@@ -840,6 +848,7 @@
   <p:clrMapOvr>
     <a:masterClrMapping/>
   </p:clrMapOvr>
+  <p:hf sldNum="0" hdr="0" ftr="0" dt="0"/>
 </p:sldLayout>
 </file>
 
@@ -969,7 +978,7 @@
             </a:pPr>
             <a:fld id="{634C9186-2F28-4E19-826F-AE5B93E5979C}" type="slidenum">
               <a:rPr lang="de-DE"/>
-              <a:t>‹#›</a:t>
+              <a:t>‹Nr.›</a:t>
             </a:fld>
             <a:endParaRPr lang="de-DE"/>
           </a:p>
@@ -1520,6 +1529,7 @@
   <p:clrMapOvr>
     <a:masterClrMapping/>
   </p:clrMapOvr>
+  <p:hf sldNum="0" hdr="0" ftr="0" dt="0"/>
 </p:sldLayout>
 </file>
 
@@ -1608,7 +1618,7 @@
             </a:pPr>
             <a:fld id="{634C9186-2F28-4E19-826F-AE5B93E5979C}" type="slidenum">
               <a:rPr lang="de-DE"/>
-              <a:t>‹#›</a:t>
+              <a:t>‹Nr.›</a:t>
             </a:fld>
             <a:endParaRPr lang="de-DE"/>
           </a:p>
@@ -1700,6 +1710,7 @@
   <p:clrMapOvr>
     <a:masterClrMapping/>
   </p:clrMapOvr>
+  <p:hf sldNum="0" hdr="0" ftr="0" dt="0"/>
 </p:sldLayout>
 </file>
 
@@ -1756,7 +1767,7 @@
             </a:pPr>
             <a:fld id="{634C9186-2F28-4E19-826F-AE5B93E5979C}" type="slidenum">
               <a:rPr lang="de-DE"/>
-              <a:t>‹#›</a:t>
+              <a:t>‹Nr.›</a:t>
             </a:fld>
             <a:endParaRPr lang="de-DE"/>
           </a:p>
@@ -1975,6 +1986,7 @@
   <p:clrMapOvr>
     <a:masterClrMapping/>
   </p:clrMapOvr>
+  <p:hf sldNum="0" hdr="0" ftr="0" dt="0"/>
 </p:sldLayout>
 </file>
 
@@ -2031,7 +2043,7 @@
             </a:pPr>
             <a:fld id="{634C9186-2F28-4E19-826F-AE5B93E5979C}" type="slidenum">
               <a:rPr lang="de-DE"/>
-              <a:t>‹#›</a:t>
+              <a:t>‹Nr.›</a:t>
             </a:fld>
             <a:endParaRPr lang="de-DE"/>
           </a:p>
@@ -2162,6 +2174,7 @@
   <p:clrMapOvr>
     <a:masterClrMapping/>
   </p:clrMapOvr>
+  <p:hf sldNum="0" hdr="0" ftr="0" dt="0"/>
 </p:sldLayout>
 </file>
 
@@ -2218,7 +2231,7 @@
             </a:pPr>
             <a:fld id="{634C9186-2F28-4E19-826F-AE5B93E5979C}" type="slidenum">
               <a:rPr lang="de-DE"/>
-              <a:t>‹#›</a:t>
+              <a:t>‹Nr.›</a:t>
             </a:fld>
             <a:endParaRPr lang="de-DE"/>
           </a:p>
@@ -2345,6 +2358,7 @@
   <p:clrMapOvr>
     <a:masterClrMapping/>
   </p:clrMapOvr>
+  <p:hf sldNum="0" hdr="0" ftr="0" dt="0"/>
 </p:sldLayout>
 </file>
 
@@ -2433,7 +2447,7 @@
             </a:pPr>
             <a:fld id="{634C9186-2F28-4E19-826F-AE5B93E5979C}" type="slidenum">
               <a:rPr lang="de-DE"/>
-              <a:t>‹#›</a:t>
+              <a:t>‹Nr.›</a:t>
             </a:fld>
             <a:endParaRPr lang="de-DE"/>
           </a:p>
@@ -2564,6 +2578,7 @@
   <p:clrMapOvr>
     <a:masterClrMapping/>
   </p:clrMapOvr>
+  <p:hf sldNum="0" hdr="0" ftr="0" dt="0"/>
 </p:sldLayout>
 </file>
 
@@ -2806,7 +2821,7 @@
             </a:pPr>
             <a:fld id="{634C9186-2F28-4E19-826F-AE5B93E5979C}" type="slidenum">
               <a:rPr lang="de-DE"/>
-              <a:t>‹#›</a:t>
+              <a:t>‹Nr.›</a:t>
             </a:fld>
             <a:endParaRPr lang="de-DE"/>
           </a:p>
@@ -2903,6 +2918,7 @@
   <p:clrMapOvr>
     <a:masterClrMapping/>
   </p:clrMapOvr>
+  <p:hf sldNum="0" hdr="0" ftr="0" dt="0"/>
 </p:sldLayout>
 </file>
 
@@ -3030,7 +3046,7 @@
             </a:pPr>
             <a:fld id="{634C9186-2F28-4E19-826F-AE5B93E5979C}" type="slidenum">
               <a:rPr lang="de-DE"/>
-              <a:t>‹#›</a:t>
+              <a:t>‹Nr.›</a:t>
             </a:fld>
             <a:endParaRPr lang="de-DE"/>
           </a:p>
@@ -3193,6 +3209,7 @@
   <p:clrMapOvr>
     <a:masterClrMapping/>
   </p:clrMapOvr>
+  <p:hf sldNum="0" hdr="0" ftr="0" dt="0"/>
 </p:sldLayout>
 </file>
 
@@ -3249,7 +3266,7 @@
             </a:pPr>
             <a:fld id="{634C9186-2F28-4E19-826F-AE5B93E5979C}" type="slidenum">
               <a:rPr lang="de-DE"/>
-              <a:t>‹#›</a:t>
+              <a:t>‹Nr.›</a:t>
             </a:fld>
             <a:endParaRPr lang="de-DE"/>
           </a:p>
@@ -3341,6 +3358,7 @@
   <p:clrMapOvr>
     <a:masterClrMapping/>
   </p:clrMapOvr>
+  <p:hf sldNum="0" hdr="0" ftr="0" dt="0"/>
 </p:sldLayout>
 </file>
 
@@ -3475,7 +3493,7 @@
     <p:sldLayoutId id="2147483654" r:id="rId9"/>
     <p:sldLayoutId id="2147483655" r:id="rId10"/>
   </p:sldLayoutIdLst>
-  <p:hf hdr="0" ftr="0" dt="0"/>
+  <p:hf sldNum="0" hdr="0" ftr="0" dt="0"/>
   <p:txStyles>
     <p:titleStyle>
       <a:lvl1pPr algn="l" defTabSz="914400">
@@ -3820,32 +3838,6 @@
           </a:p>
         </p:txBody>
       </p:sp>
-      <p:sp>
-        <p:nvSpPr>
-          <p:cNvPr id="3" name="Slide Number Placeholder 2"/>
-          <p:cNvSpPr>
-            <a:spLocks noGrp="1"/>
-          </p:cNvSpPr>
-          <p:nvPr>
-            <p:ph type="sldNum" sz="quarter" idx="12"/>
-          </p:nvPr>
-        </p:nvSpPr>
-        <p:spPr bwMode="auto"/>
-        <p:txBody>
-          <a:bodyPr/>
-          <a:lstStyle/>
-          <a:p>
-            <a:pPr>
-              <a:defRPr/>
-            </a:pPr>
-            <a:fld id="{634C9186-2F28-4E19-826F-AE5B93E5979C}" type="slidenum">
-              <a:rPr lang="de-DE"/>
-              <a:t>1</a:t>
-            </a:fld>
-            <a:endParaRPr lang="de-DE"/>
-          </a:p>
-        </p:txBody>
-      </p:sp>
     </p:spTree>
   </p:cSld>
   <p:clrMapOvr>
@@ -4111,7 +4103,7 @@
         <p:spPr bwMode="auto">
           <a:xfrm>
             <a:off x="515936" y="3999988"/>
-            <a:ext cx="10212315" cy="830997"/>
+            <a:ext cx="10212315" cy="584775"/>
           </a:xfrm>
           <a:prstGeom prst="rect">
             <a:avLst/>
@@ -4119,7 +4111,7 @@
           <a:noFill/>
         </p:spPr>
         <p:txBody>
-          <a:bodyPr wrap="square" rtlCol="0">
+          <a:bodyPr wrap="square" lIns="91440" tIns="45720" rIns="91440" bIns="45720" rtlCol="0" anchor="t">
             <a:spAutoFit/>
           </a:bodyPr>
           <a:lstStyle/>
@@ -4142,48 +4134,6 @@
               <a:t>Metered Day = day appearing in the available data</a:t>
             </a:r>
             <a:endParaRPr dirty="0"/>
-          </a:p>
-          <a:p>
-            <a:pPr>
-              <a:defRPr/>
-            </a:pPr>
-            <a:r>
-              <a:rPr lang="en-US" sz="1600" dirty="0"/>
-              <a:t>Interval = from earliest to latest metered day</a:t>
-            </a:r>
-            <a:endParaRPr dirty="0"/>
-          </a:p>
-        </p:txBody>
-      </p:sp>
-      <p:sp>
-        <p:nvSpPr>
-          <p:cNvPr id="2" name="Slide Number Placeholder 1">
-            <a:extLst>
-              <a:ext uri="{FF2B5EF4-FFF2-40B4-BE49-F238E27FC236}">
-                <a16:creationId xmlns:a16="http://schemas.microsoft.com/office/drawing/2014/main" id="{A7CABF7E-D33E-8F35-1A2A-2D040DEB5CE6}"/>
-              </a:ext>
-            </a:extLst>
-          </p:cNvPr>
-          <p:cNvSpPr>
-            <a:spLocks noGrp="1"/>
-          </p:cNvSpPr>
-          <p:nvPr>
-            <p:ph type="sldNum" sz="quarter" idx="12"/>
-          </p:nvPr>
-        </p:nvSpPr>
-        <p:spPr/>
-        <p:txBody>
-          <a:bodyPr/>
-          <a:lstStyle/>
-          <a:p>
-            <a:pPr>
-              <a:defRPr/>
-            </a:pPr>
-            <a:fld id="{634C9186-2F28-4E19-826F-AE5B93E5979C}" type="slidenum">
-              <a:rPr lang="de-DE" smtClean="0"/>
-              <a:t>2</a:t>
-            </a:fld>
-            <a:endParaRPr lang="de-DE"/>
           </a:p>
         </p:txBody>
       </p:sp>

</xml_diff>